<commit_message>
Add Lectures and Exercises
</commit_message>
<xml_diff>
--- a/Data-Structure/Handon/01-time-complexity/00_Lecture_01.pptx
+++ b/Data-Structure/Handon/01-time-complexity/00_Lecture_01.pptx
@@ -114,6 +114,11 @@
       </a:defRPr>
     </a:lvl9pPr>
   </p:defaultTextStyle>
+  <p:extLst>
+    <p:ext uri="{EFAFB233-063F-42B5-8137-9DF3F51BA10A}">
+      <p15:sldGuideLst xmlns:p15="http://schemas.microsoft.com/office/powerpoint/2012/main"/>
+    </p:ext>
+  </p:extLst>
 </p:presentation>
 </file>
 
@@ -3482,8 +3487,8 @@
           </a:p>
         </p:txBody>
       </p:sp>
-      <mc:AlternateContent xmlns:mc="http://schemas.openxmlformats.org/markup-compatibility/2006">
-        <mc:Choice xmlns:a14="http://schemas.microsoft.com/office/drawing/2010/main" Requires="a14">
+      <mc:AlternateContent xmlns:mc="http://schemas.openxmlformats.org/markup-compatibility/2006" xmlns:a14="http://schemas.microsoft.com/office/drawing/2010/main">
+        <mc:Choice Requires="a14">
           <p:sp>
             <p:nvSpPr>
               <p:cNvPr id="3" name="Content Placeholder 2">
@@ -3583,7 +3588,7 @@
                           <a:latin typeface="Times New Roman" panose="02020603050405020304" pitchFamily="18" charset="0"/>
                           <a:cs typeface="Times New Roman" panose="02020603050405020304" pitchFamily="18" charset="0"/>
                         </a:rPr>
-                        <m:t>) * </m:t>
+                        <m:t>) ∗ </m:t>
                       </m:r>
                       <m:r>
                         <m:rPr>
@@ -3696,7 +3701,7 @@
             </p:txBody>
           </p:sp>
         </mc:Choice>
-        <mc:Fallback>
+        <mc:Fallback xmlns="">
           <p:sp>
             <p:nvSpPr>
               <p:cNvPr id="3" name="Content Placeholder 2">
@@ -3798,8 +3803,8 @@
           </a:p>
         </p:txBody>
       </p:sp>
-      <mc:AlternateContent xmlns:mc="http://schemas.openxmlformats.org/markup-compatibility/2006">
-        <mc:Choice xmlns:a14="http://schemas.microsoft.com/office/drawing/2010/main" Requires="a14">
+      <mc:AlternateContent xmlns:mc="http://schemas.openxmlformats.org/markup-compatibility/2006" xmlns:a14="http://schemas.microsoft.com/office/drawing/2010/main">
+        <mc:Choice Requires="a14">
           <p:sp>
             <p:nvSpPr>
               <p:cNvPr id="3" name="Content Placeholder 2">
@@ -3984,7 +3989,7 @@
             </p:txBody>
           </p:sp>
         </mc:Choice>
-        <mc:Fallback>
+        <mc:Fallback xmlns="">
           <p:sp>
             <p:nvSpPr>
               <p:cNvPr id="3" name="Content Placeholder 2">
@@ -4126,7 +4131,7 @@
                     <a:latin typeface="Times New Roman" panose="02020603050405020304" pitchFamily="18" charset="0"/>
                     <a:cs typeface="Times New Roman" panose="02020603050405020304" pitchFamily="18" charset="0"/>
                   </a:rPr>
-                  <a:t>Have students generate 5 polynomial functions of different degrees (e.g., </a:t>
+                  <a:t>(e.g., </a:t>
                 </a:r>
                 <a14:m>
                   <m:oMath xmlns:m="http://schemas.openxmlformats.org/officeDocument/2006/math">
@@ -4320,14 +4325,15 @@
                     <a:latin typeface="Times New Roman" panose="02020603050405020304" pitchFamily="18" charset="0"/>
                     <a:cs typeface="Times New Roman" panose="02020603050405020304" pitchFamily="18" charset="0"/>
                   </a:rPr>
-                  <a:t>) and order them based on their asymptotic growth. Discuss the reasoning behind the ordering.</a:t>
+                  <a:t>) order them based on their asymptotic </a:t>
                 </a:r>
-                <a:br>
-                  <a:rPr lang="en-US" dirty="0">
+                <a:r>
+                  <a:rPr lang="en-US">
                     <a:latin typeface="Times New Roman" panose="02020603050405020304" pitchFamily="18" charset="0"/>
                     <a:cs typeface="Times New Roman" panose="02020603050405020304" pitchFamily="18" charset="0"/>
                   </a:rPr>
-                </a:br>
+                  <a:t>growth.</a:t>
+                </a:r>
                 <a:endParaRPr lang="en-US" dirty="0">
                   <a:latin typeface="Times New Roman" panose="02020603050405020304" pitchFamily="18" charset="0"/>
                   <a:cs typeface="Times New Roman" panose="02020603050405020304" pitchFamily="18" charset="0"/>
@@ -4532,8 +4538,8 @@
           </a:p>
         </p:txBody>
       </p:sp>
-      <mc:AlternateContent xmlns:mc="http://schemas.openxmlformats.org/markup-compatibility/2006">
-        <mc:Choice xmlns:a14="http://schemas.microsoft.com/office/drawing/2010/main" Requires="a14">
+      <mc:AlternateContent xmlns:mc="http://schemas.openxmlformats.org/markup-compatibility/2006" xmlns:a14="http://schemas.microsoft.com/office/drawing/2010/main">
+        <mc:Choice Requires="a14">
           <p:sp>
             <p:nvSpPr>
               <p:cNvPr id="3" name="Content Placeholder 2">
@@ -4655,14 +4661,7 @@
                                           <a:latin typeface="Cambria Math" panose="02040503050406030204" pitchFamily="18" charset="0"/>
                                           <a:cs typeface="Times New Roman" panose="02020603050405020304" pitchFamily="18" charset="0"/>
                                         </a:rPr>
-                                        <m:t>𝑙</m:t>
-                                      </m:r>
-                                      <m:r>
-                                        <a:rPr lang="en-US" b="0" i="1" smtClean="0">
-                                          <a:latin typeface="Cambria Math" panose="02040503050406030204" pitchFamily="18" charset="0"/>
-                                          <a:cs typeface="Times New Roman" panose="02020603050405020304" pitchFamily="18" charset="0"/>
-                                        </a:rPr>
-                                        <m:t>𝑜𝑔</m:t>
+                                        <m:t>𝑙𝑜𝑔</m:t>
                                       </m:r>
                                       <m:d>
                                         <m:dPr>
@@ -4746,7 +4745,7 @@
             </p:txBody>
           </p:sp>
         </mc:Choice>
-        <mc:Fallback>
+        <mc:Fallback xmlns="">
           <p:sp>
             <p:nvSpPr>
               <p:cNvPr id="3" name="Content Placeholder 2">
@@ -4848,8 +4847,8 @@
           </a:p>
         </p:txBody>
       </p:sp>
-      <mc:AlternateContent xmlns:mc="http://schemas.openxmlformats.org/markup-compatibility/2006">
-        <mc:Choice xmlns:a14="http://schemas.microsoft.com/office/drawing/2010/main" Requires="a14">
+      <mc:AlternateContent xmlns:mc="http://schemas.openxmlformats.org/markup-compatibility/2006" xmlns:a14="http://schemas.microsoft.com/office/drawing/2010/main">
+        <mc:Choice Requires="a14">
           <p:sp>
             <p:nvSpPr>
               <p:cNvPr id="3" name="Content Placeholder 2">
@@ -5005,7 +5004,7 @@
             </p:txBody>
           </p:sp>
         </mc:Choice>
-        <mc:Fallback>
+        <mc:Fallback xmlns="">
           <p:sp>
             <p:nvSpPr>
               <p:cNvPr id="3" name="Content Placeholder 2">
@@ -5107,8 +5106,8 @@
           </a:p>
         </p:txBody>
       </p:sp>
-      <mc:AlternateContent xmlns:mc="http://schemas.openxmlformats.org/markup-compatibility/2006">
-        <mc:Choice xmlns:a14="http://schemas.microsoft.com/office/drawing/2010/main" Requires="a14">
+      <mc:AlternateContent xmlns:mc="http://schemas.openxmlformats.org/markup-compatibility/2006" xmlns:a14="http://schemas.microsoft.com/office/drawing/2010/main">
+        <mc:Choice Requires="a14">
           <p:sp>
             <p:nvSpPr>
               <p:cNvPr id="3" name="Content Placeholder 2">
@@ -5393,7 +5392,7 @@
             </p:txBody>
           </p:sp>
         </mc:Choice>
-        <mc:Fallback>
+        <mc:Fallback xmlns="">
           <p:sp>
             <p:nvSpPr>
               <p:cNvPr id="3" name="Content Placeholder 2">
@@ -5495,8 +5494,8 @@
           </a:p>
         </p:txBody>
       </p:sp>
-      <mc:AlternateContent xmlns:mc="http://schemas.openxmlformats.org/markup-compatibility/2006">
-        <mc:Choice xmlns:a14="http://schemas.microsoft.com/office/drawing/2010/main" Requires="a14">
+      <mc:AlternateContent xmlns:mc="http://schemas.openxmlformats.org/markup-compatibility/2006" xmlns:a14="http://schemas.microsoft.com/office/drawing/2010/main">
+        <mc:Choice Requires="a14">
           <p:sp>
             <p:nvSpPr>
               <p:cNvPr id="3" name="Content Placeholder 2">
@@ -5655,7 +5654,7 @@
             </p:txBody>
           </p:sp>
         </mc:Choice>
-        <mc:Fallback>
+        <mc:Fallback xmlns="">
           <p:sp>
             <p:nvSpPr>
               <p:cNvPr id="3" name="Content Placeholder 2">
@@ -5757,8 +5756,8 @@
           </a:p>
         </p:txBody>
       </p:sp>
-      <mc:AlternateContent xmlns:mc="http://schemas.openxmlformats.org/markup-compatibility/2006">
-        <mc:Choice xmlns:a14="http://schemas.microsoft.com/office/drawing/2010/main" Requires="a14">
+      <mc:AlternateContent xmlns:mc="http://schemas.openxmlformats.org/markup-compatibility/2006" xmlns:a14="http://schemas.microsoft.com/office/drawing/2010/main">
+        <mc:Choice Requires="a14">
           <p:sp>
             <p:nvSpPr>
               <p:cNvPr id="3" name="Content Placeholder 2">
@@ -5920,7 +5919,7 @@
             </p:txBody>
           </p:sp>
         </mc:Choice>
-        <mc:Fallback>
+        <mc:Fallback xmlns="">
           <p:sp>
             <p:nvSpPr>
               <p:cNvPr id="3" name="Content Placeholder 2">
@@ -6022,8 +6021,8 @@
           </a:p>
         </p:txBody>
       </p:sp>
-      <mc:AlternateContent xmlns:mc="http://schemas.openxmlformats.org/markup-compatibility/2006">
-        <mc:Choice xmlns:a14="http://schemas.microsoft.com/office/drawing/2010/main" Requires="a14">
+      <mc:AlternateContent xmlns:mc="http://schemas.openxmlformats.org/markup-compatibility/2006" xmlns:a14="http://schemas.microsoft.com/office/drawing/2010/main">
+        <mc:Choice Requires="a14">
           <p:sp>
             <p:nvSpPr>
               <p:cNvPr id="3" name="Content Placeholder 2">
@@ -6155,7 +6154,7 @@
                           <a:latin typeface="Times New Roman" panose="02020603050405020304" pitchFamily="18" charset="0"/>
                           <a:cs typeface="Times New Roman" panose="02020603050405020304" pitchFamily="18" charset="0"/>
                         </a:rPr>
-                        <m:t>*</m:t>
+                        <m:t>∗</m:t>
                       </m:r>
                       <m:func>
                         <m:funcPr>
@@ -6312,7 +6311,7 @@
             </p:txBody>
           </p:sp>
         </mc:Choice>
-        <mc:Fallback>
+        <mc:Fallback xmlns="">
           <p:sp>
             <p:nvSpPr>
               <p:cNvPr id="3" name="Content Placeholder 2">

</xml_diff>